<commit_message>
Dokončenie prezentácie na 3. cv
</commit_message>
<xml_diff>
--- a/PPT 3.pptx
+++ b/PPT 3.pptx
@@ -200,7 +200,7 @@
           <a:p>
             <a:fld id="{33CCF7D5-9BE0-42FF-9F6F-548B6598B189}" type="datetimeFigureOut">
               <a:rPr lang="sk-SK" smtClean="0"/>
-              <a:t>26.2.2018</a:t>
+              <a:t>27.2.2018</a:t>
             </a:fld>
             <a:endParaRPr lang="sk-SK"/>
           </a:p>
@@ -698,7 +698,7 @@
           <a:p>
             <a:fld id="{9401BF95-34C0-41F0-9199-065930FE6469}" type="datetimeFigureOut">
               <a:rPr lang="sk-SK" smtClean="0"/>
-              <a:t>26.2.2018</a:t>
+              <a:t>27.2.2018</a:t>
             </a:fld>
             <a:endParaRPr lang="sk-SK"/>
           </a:p>
@@ -896,7 +896,7 @@
           <a:p>
             <a:fld id="{9401BF95-34C0-41F0-9199-065930FE6469}" type="datetimeFigureOut">
               <a:rPr lang="sk-SK" smtClean="0"/>
-              <a:t>26.2.2018</a:t>
+              <a:t>27.2.2018</a:t>
             </a:fld>
             <a:endParaRPr lang="sk-SK"/>
           </a:p>
@@ -1104,7 +1104,7 @@
           <a:p>
             <a:fld id="{9401BF95-34C0-41F0-9199-065930FE6469}" type="datetimeFigureOut">
               <a:rPr lang="sk-SK" smtClean="0"/>
-              <a:t>26.2.2018</a:t>
+              <a:t>27.2.2018</a:t>
             </a:fld>
             <a:endParaRPr lang="sk-SK"/>
           </a:p>
@@ -1302,7 +1302,7 @@
           <a:p>
             <a:fld id="{9401BF95-34C0-41F0-9199-065930FE6469}" type="datetimeFigureOut">
               <a:rPr lang="sk-SK" smtClean="0"/>
-              <a:t>26.2.2018</a:t>
+              <a:t>27.2.2018</a:t>
             </a:fld>
             <a:endParaRPr lang="sk-SK"/>
           </a:p>
@@ -1577,7 +1577,7 @@
           <a:p>
             <a:fld id="{9401BF95-34C0-41F0-9199-065930FE6469}" type="datetimeFigureOut">
               <a:rPr lang="sk-SK" smtClean="0"/>
-              <a:t>26.2.2018</a:t>
+              <a:t>27.2.2018</a:t>
             </a:fld>
             <a:endParaRPr lang="sk-SK"/>
           </a:p>
@@ -1842,7 +1842,7 @@
           <a:p>
             <a:fld id="{9401BF95-34C0-41F0-9199-065930FE6469}" type="datetimeFigureOut">
               <a:rPr lang="sk-SK" smtClean="0"/>
-              <a:t>26.2.2018</a:t>
+              <a:t>27.2.2018</a:t>
             </a:fld>
             <a:endParaRPr lang="sk-SK"/>
           </a:p>
@@ -2254,7 +2254,7 @@
           <a:p>
             <a:fld id="{9401BF95-34C0-41F0-9199-065930FE6469}" type="datetimeFigureOut">
               <a:rPr lang="sk-SK" smtClean="0"/>
-              <a:t>26.2.2018</a:t>
+              <a:t>27.2.2018</a:t>
             </a:fld>
             <a:endParaRPr lang="sk-SK"/>
           </a:p>
@@ -2395,7 +2395,7 @@
           <a:p>
             <a:fld id="{9401BF95-34C0-41F0-9199-065930FE6469}" type="datetimeFigureOut">
               <a:rPr lang="sk-SK" smtClean="0"/>
-              <a:t>26.2.2018</a:t>
+              <a:t>27.2.2018</a:t>
             </a:fld>
             <a:endParaRPr lang="sk-SK"/>
           </a:p>
@@ -2508,7 +2508,7 @@
           <a:p>
             <a:fld id="{9401BF95-34C0-41F0-9199-065930FE6469}" type="datetimeFigureOut">
               <a:rPr lang="sk-SK" smtClean="0"/>
-              <a:t>26.2.2018</a:t>
+              <a:t>27.2.2018</a:t>
             </a:fld>
             <a:endParaRPr lang="sk-SK"/>
           </a:p>
@@ -2819,7 +2819,7 @@
           <a:p>
             <a:fld id="{9401BF95-34C0-41F0-9199-065930FE6469}" type="datetimeFigureOut">
               <a:rPr lang="sk-SK" smtClean="0"/>
-              <a:t>26.2.2018</a:t>
+              <a:t>27.2.2018</a:t>
             </a:fld>
             <a:endParaRPr lang="sk-SK"/>
           </a:p>
@@ -3107,7 +3107,7 @@
           <a:p>
             <a:fld id="{9401BF95-34C0-41F0-9199-065930FE6469}" type="datetimeFigureOut">
               <a:rPr lang="sk-SK" smtClean="0"/>
-              <a:t>26.2.2018</a:t>
+              <a:t>27.2.2018</a:t>
             </a:fld>
             <a:endParaRPr lang="sk-SK"/>
           </a:p>
@@ -3348,7 +3348,7 @@
           <a:p>
             <a:fld id="{9401BF95-34C0-41F0-9199-065930FE6469}" type="datetimeFigureOut">
               <a:rPr lang="sk-SK" smtClean="0"/>
-              <a:t>26.2.2018</a:t>
+              <a:t>27.2.2018</a:t>
             </a:fld>
             <a:endParaRPr lang="sk-SK"/>
           </a:p>
@@ -4148,7 +4148,7 @@
           <a:lstStyle/>
           <a:p>
             <a:r>
-              <a:rPr lang="sk-SK" dirty="0"/>
+              <a:rPr lang="sk-SK" i="1" dirty="0"/>
               <a:t>1. Opis riešeného problému	</a:t>
             </a:r>
           </a:p>
@@ -4182,30 +4182,34 @@
           <a:p>
             <a:r>
               <a:rPr lang="sk-SK" dirty="0"/>
-              <a:t>Identifikovali sme daný problém zo strany klienta</a:t>
+              <a:t>Manažment ľadovej plochy štadiónu</a:t>
             </a:r>
           </a:p>
           <a:p>
             <a:r>
               <a:rPr lang="sk-SK" dirty="0"/>
-              <a:t>Opísali sme ho do </a:t>
-            </a:r>
-            <a:r>
-              <a:rPr lang="sk-SK" dirty="0" err="1"/>
-              <a:t>doc</a:t>
-            </a:r>
+              <a:t>Zabezpečiť efektívne plánovanie a zmeny</a:t>
+            </a:r>
+          </a:p>
+          <a:p>
             <a:r>
               <a:rPr lang="sk-SK" dirty="0"/>
-              <a:t>-u v EA</a:t>
-            </a:r>
-          </a:p>
-          <a:p>
+              <a:t>Možnosť správy zmien, pracovníkov obsluhujúcich</a:t>
+            </a:r>
+          </a:p>
+          <a:p>
+            <a:pPr marL="0" indent="0">
+              <a:buNone/>
+            </a:pPr>
             <a:r>
               <a:rPr lang="sk-SK" dirty="0"/>
-              <a:t>Problém sa týkal  manažovania ľadového štadiónu</a:t>
-            </a:r>
-          </a:p>
-          <a:p>
+              <a:t> prevádzku štadiónu</a:t>
+            </a:r>
+          </a:p>
+          <a:p>
+            <a:pPr marL="0" indent="0">
+              <a:buNone/>
+            </a:pPr>
             <a:endParaRPr lang="sk-SK" dirty="0"/>
           </a:p>
           <a:p>
@@ -4214,8 +4218,8 @@
               <a:buChar char="q"/>
             </a:pPr>
             <a:r>
-              <a:rPr lang="sk-SK" i="1" dirty="0"/>
-              <a:t>Schváliť klientom</a:t>
+              <a:rPr lang="sk-SK" dirty="0"/>
+              <a:t>Konzultácia s klientom</a:t>
             </a:r>
           </a:p>
         </p:txBody>
@@ -4249,8 +4253,8 @@
         </p:blipFill>
         <p:spPr bwMode="auto">
           <a:xfrm rot="20097996">
-            <a:off x="6919989" y="3453318"/>
-            <a:ext cx="4558649" cy="2421782"/>
+            <a:off x="7530832" y="3818280"/>
+            <a:ext cx="3872200" cy="2057106"/>
           </a:xfrm>
           <a:prstGeom prst="rect">
             <a:avLst/>
@@ -4319,48 +4323,57 @@
           <a:lstStyle/>
           <a:p>
             <a:r>
+              <a:rPr lang="sk-SK" i="1" dirty="0"/>
+              <a:t>2. Ciele projektu</a:t>
+            </a:r>
+          </a:p>
+        </p:txBody>
+      </p:sp>
+      <p:sp>
+        <p:nvSpPr>
+          <p:cNvPr id="3" name="Zástupný objekt pre obsah 2">
+            <a:extLst>
+              <a:ext uri="{FF2B5EF4-FFF2-40B4-BE49-F238E27FC236}">
+                <a16:creationId xmlns:a16="http://schemas.microsoft.com/office/drawing/2014/main" id="{712CACB0-F541-42C6-B958-1CD51C1A8A31}"/>
+              </a:ext>
+            </a:extLst>
+          </p:cNvPr>
+          <p:cNvSpPr>
+            <a:spLocks noGrp="1"/>
+          </p:cNvSpPr>
+          <p:nvPr>
+            <p:ph idx="1"/>
+          </p:nvPr>
+        </p:nvSpPr>
+        <p:spPr/>
+        <p:txBody>
+          <a:bodyPr/>
+          <a:lstStyle/>
+          <a:p>
+            <a:r>
               <a:rPr lang="sk-SK" dirty="0"/>
-              <a:t>2. Ciele projektu</a:t>
-            </a:r>
-          </a:p>
-        </p:txBody>
-      </p:sp>
-      <p:sp>
-        <p:nvSpPr>
-          <p:cNvPr id="3" name="Zástupný objekt pre obsah 2">
-            <a:extLst>
-              <a:ext uri="{FF2B5EF4-FFF2-40B4-BE49-F238E27FC236}">
-                <a16:creationId xmlns:a16="http://schemas.microsoft.com/office/drawing/2014/main" id="{712CACB0-F541-42C6-B958-1CD51C1A8A31}"/>
-              </a:ext>
-            </a:extLst>
-          </p:cNvPr>
-          <p:cNvSpPr>
-            <a:spLocks noGrp="1"/>
-          </p:cNvSpPr>
-          <p:nvPr>
-            <p:ph idx="1"/>
-          </p:nvPr>
-        </p:nvSpPr>
-        <p:spPr/>
-        <p:txBody>
-          <a:bodyPr/>
-          <a:lstStyle/>
+              <a:t>Zrýchlenie rezervácií a manažovanie zimného štadiónu</a:t>
+            </a:r>
+          </a:p>
           <a:p>
             <a:r>
               <a:rPr lang="sk-SK" dirty="0"/>
-              <a:t>Určili sme hlavné ciele projektu</a:t>
-            </a:r>
-          </a:p>
-          <a:p>
+              <a:t>Online správa a možnosť zmien pracovníkov zabezpečujúcich</a:t>
+            </a:r>
+          </a:p>
+          <a:p>
+            <a:pPr marL="0" indent="0">
+              <a:buNone/>
+            </a:pPr>
             <a:r>
               <a:rPr lang="sk-SK" dirty="0"/>
-              <a:t>Avšak zistili sme že, niektoré sú nám ešte stále nejasne definované</a:t>
+              <a:t> prevádzku štadiónu</a:t>
             </a:r>
           </a:p>
           <a:p>
             <a:r>
               <a:rPr lang="sk-SK" dirty="0"/>
-              <a:t>Musíme dokonzultovať s klientom</a:t>
+              <a:t>Poskytovanie informácií verejnosti s možnosťou chatu</a:t>
             </a:r>
           </a:p>
           <a:p>
@@ -4373,17 +4386,11 @@
             </a:pPr>
             <a:r>
               <a:rPr lang="sk-SK" i="1" dirty="0"/>
-              <a:t>Zlepšiť komunikáciu na oboch </a:t>
-            </a:r>
-          </a:p>
-          <a:p>
-            <a:pPr marL="0" indent="0">
-              <a:buNone/>
-            </a:pPr>
-            <a:r>
-              <a:rPr lang="sk-SK" i="1" dirty="0"/>
-              <a:t>stranách</a:t>
-            </a:r>
+              <a:t>Validácia klientom</a:t>
+            </a:r>
+          </a:p>
+          <a:p>
+            <a:endParaRPr lang="sk-SK" i="1" dirty="0"/>
           </a:p>
         </p:txBody>
       </p:sp>
@@ -4416,8 +4423,8 @@
         </p:blipFill>
         <p:spPr bwMode="auto">
           <a:xfrm>
-            <a:off x="6485105" y="3589505"/>
-            <a:ext cx="4695218" cy="2347609"/>
+            <a:off x="7787148" y="4475459"/>
+            <a:ext cx="3874955" cy="1937478"/>
           </a:xfrm>
           <a:prstGeom prst="rect">
             <a:avLst/>
@@ -4486,70 +4493,63 @@
           <a:lstStyle/>
           <a:p>
             <a:r>
+              <a:rPr lang="sk-SK" i="1" dirty="0"/>
+              <a:t>3. </a:t>
+            </a:r>
+            <a:r>
+              <a:rPr lang="sk-SK" i="1" dirty="0" err="1"/>
+              <a:t>Ne</a:t>
+            </a:r>
+            <a:r>
+              <a:rPr lang="sk-SK" i="1" dirty="0"/>
+              <a:t>/funkčné vlastnosti</a:t>
+            </a:r>
+          </a:p>
+        </p:txBody>
+      </p:sp>
+      <p:sp>
+        <p:nvSpPr>
+          <p:cNvPr id="3" name="Zástupný objekt pre obsah 2">
+            <a:extLst>
+              <a:ext uri="{FF2B5EF4-FFF2-40B4-BE49-F238E27FC236}">
+                <a16:creationId xmlns:a16="http://schemas.microsoft.com/office/drawing/2014/main" id="{9AD81017-5219-4DF0-888F-470825E5C584}"/>
+              </a:ext>
+            </a:extLst>
+          </p:cNvPr>
+          <p:cNvSpPr>
+            <a:spLocks noGrp="1"/>
+          </p:cNvSpPr>
+          <p:nvPr>
+            <p:ph idx="1"/>
+          </p:nvPr>
+        </p:nvSpPr>
+        <p:spPr/>
+        <p:txBody>
+          <a:bodyPr/>
+          <a:lstStyle/>
+          <a:p>
+            <a:r>
               <a:rPr lang="sk-SK" dirty="0"/>
-              <a:t>3. </a:t>
-            </a:r>
-            <a:r>
-              <a:rPr lang="sk-SK" dirty="0" err="1"/>
-              <a:t>Ne</a:t>
-            </a:r>
+              <a:t>Možnosť registrácie, rezervácie ľadovej plochy zákazníkom</a:t>
+            </a:r>
+          </a:p>
+          <a:p>
             <a:r>
               <a:rPr lang="sk-SK" dirty="0"/>
-              <a:t>/funkčné vlastnosti</a:t>
-            </a:r>
-          </a:p>
-        </p:txBody>
-      </p:sp>
-      <p:sp>
-        <p:nvSpPr>
-          <p:cNvPr id="3" name="Zástupný objekt pre obsah 2">
-            <a:extLst>
-              <a:ext uri="{FF2B5EF4-FFF2-40B4-BE49-F238E27FC236}">
-                <a16:creationId xmlns:a16="http://schemas.microsoft.com/office/drawing/2014/main" id="{9AD81017-5219-4DF0-888F-470825E5C584}"/>
-              </a:ext>
-            </a:extLst>
-          </p:cNvPr>
-          <p:cNvSpPr>
-            <a:spLocks noGrp="1"/>
-          </p:cNvSpPr>
-          <p:nvPr>
-            <p:ph idx="1"/>
-          </p:nvPr>
-        </p:nvSpPr>
-        <p:spPr/>
-        <p:txBody>
-          <a:bodyPr/>
-          <a:lstStyle/>
+              <a:t>Jednoduchý prehľad zápasov v kalendári</a:t>
+            </a:r>
+          </a:p>
           <a:p>
             <a:r>
               <a:rPr lang="sk-SK" dirty="0"/>
-              <a:t>Spracovali sme hlavne funkčné vlastnosti</a:t>
+              <a:t>Manažment zmien strojníkov</a:t>
             </a:r>
           </a:p>
           <a:p>
             <a:r>
               <a:rPr lang="sk-SK" dirty="0"/>
-              <a:t>Určili primárne </a:t>
-            </a:r>
-            <a:r>
-              <a:rPr lang="sk-SK" dirty="0" err="1"/>
-              <a:t>nefunčkné</a:t>
-            </a:r>
-            <a:r>
-              <a:rPr lang="sk-SK" dirty="0"/>
-              <a:t> </a:t>
-            </a:r>
-            <a:r>
-              <a:rPr lang="sk-SK" dirty="0" err="1"/>
-              <a:t>vlastnoti</a:t>
-            </a:r>
-            <a:r>
-              <a:rPr lang="sk-SK" dirty="0"/>
-              <a:t> produktu</a:t>
-            </a:r>
-          </a:p>
-          <a:p>
-            <a:endParaRPr lang="sk-SK" dirty="0"/>
+              <a:t>FAQ + chat so zákazníkom</a:t>
+            </a:r>
           </a:p>
           <a:p>
             <a:endParaRPr lang="sk-SK" dirty="0"/>
@@ -4560,8 +4560,8 @@
               <a:buChar char="q"/>
             </a:pPr>
             <a:r>
-              <a:rPr lang="sk-SK" i="1" dirty="0"/>
-              <a:t>Dokončiť na dnešnom (3.) cvičení</a:t>
+              <a:rPr lang="sk-SK" dirty="0"/>
+              <a:t>Doplnenie, validácie klientom</a:t>
             </a:r>
           </a:p>
         </p:txBody>

</xml_diff>

<commit_message>
Úlohy na 4. cvičenie
</commit_message>
<xml_diff>
--- a/PPT 3.pptx
+++ b/PPT 3.pptx
@@ -4207,6 +4207,17 @@
             </a:r>
           </a:p>
           <a:p>
+            <a:r>
+              <a:rPr lang="sk-SK" dirty="0"/>
+              <a:t>Väčšia </a:t>
+            </a:r>
+            <a:r>
+              <a:rPr lang="sk-SK"/>
+              <a:t>dostupnosť informácií</a:t>
+            </a:r>
+            <a:endParaRPr lang="sk-SK" dirty="0"/>
+          </a:p>
+          <a:p>
             <a:pPr marL="0" indent="0">
               <a:buNone/>
             </a:pPr>
@@ -4571,8 +4582,13 @@
             </a:pPr>
             <a:r>
               <a:rPr lang="sk-SK" dirty="0"/>
-              <a:t> kompatibilita</a:t>
-            </a:r>
+              <a:t> </a:t>
+            </a:r>
+            <a:r>
+              <a:rPr lang="sk-SK" dirty="0" err="1"/>
+              <a:t>kompatibilita,bezpečnosť,web</a:t>
+            </a:r>
+            <a:endParaRPr lang="sk-SK" dirty="0"/>
           </a:p>
           <a:p>
             <a:endParaRPr lang="sk-SK" dirty="0"/>
@@ -4584,7 +4600,7 @@
             </a:pPr>
             <a:r>
               <a:rPr lang="sk-SK" dirty="0"/>
-              <a:t>Doplnenie, validácie klientom</a:t>
+              <a:t>Priority, validácie klientom</a:t>
             </a:r>
           </a:p>
         </p:txBody>

</xml_diff>